<commit_message>
Update pptx and styles fix
</commit_message>
<xml_diff>
--- a/Файл.pptx
+++ b/Файл.pptx
@@ -11,6 +11,13 @@
     <p:sldId id="259" r:id="rId5"/>
     <p:sldId id="260" r:id="rId6"/>
     <p:sldId id="261" r:id="rId7"/>
+    <p:sldId id="262" r:id="rId8"/>
+    <p:sldId id="263" r:id="rId9"/>
+    <p:sldId id="264" r:id="rId10"/>
+    <p:sldId id="265" r:id="rId11"/>
+    <p:sldId id="267" r:id="rId12"/>
+    <p:sldId id="268" r:id="rId13"/>
+    <p:sldId id="266" r:id="rId14"/>
   </p:sldIdLst>
   <p:sldSz cx="12192000" cy="6858000"/>
   <p:notesSz cx="6858000" cy="9144000"/>
@@ -1725,7 +1732,7 @@
           <a:p>
             <a:fld id="{73A3F40E-9102-4FC0-9332-A502299818A0}" type="datetimeFigureOut">
               <a:rPr lang="ru-RU" smtClean="0"/>
-              <a:t>23.01.2023</a:t>
+              <a:t>02.02.2023</a:t>
             </a:fld>
             <a:endParaRPr lang="ru-RU"/>
           </a:p>
@@ -1976,7 +1983,7 @@
           <a:p>
             <a:fld id="{73A3F40E-9102-4FC0-9332-A502299818A0}" type="datetimeFigureOut">
               <a:rPr lang="ru-RU" smtClean="0"/>
-              <a:t>23.01.2023</a:t>
+              <a:t>02.02.2023</a:t>
             </a:fld>
             <a:endParaRPr lang="ru-RU"/>
           </a:p>
@@ -2290,7 +2297,7 @@
           <a:p>
             <a:fld id="{73A3F40E-9102-4FC0-9332-A502299818A0}" type="datetimeFigureOut">
               <a:rPr lang="ru-RU" smtClean="0"/>
-              <a:t>23.01.2023</a:t>
+              <a:t>02.02.2023</a:t>
             </a:fld>
             <a:endParaRPr lang="ru-RU"/>
           </a:p>
@@ -2631,7 +2638,7 @@
           <a:p>
             <a:fld id="{73A3F40E-9102-4FC0-9332-A502299818A0}" type="datetimeFigureOut">
               <a:rPr lang="ru-RU" smtClean="0"/>
-              <a:t>23.01.2023</a:t>
+              <a:t>02.02.2023</a:t>
             </a:fld>
             <a:endParaRPr lang="ru-RU"/>
           </a:p>
@@ -2945,7 +2952,7 @@
           <a:p>
             <a:fld id="{73A3F40E-9102-4FC0-9332-A502299818A0}" type="datetimeFigureOut">
               <a:rPr lang="ru-RU" smtClean="0"/>
-              <a:t>23.01.2023</a:t>
+              <a:t>02.02.2023</a:t>
             </a:fld>
             <a:endParaRPr lang="ru-RU"/>
           </a:p>
@@ -3338,7 +3345,7 @@
           <a:p>
             <a:fld id="{73A3F40E-9102-4FC0-9332-A502299818A0}" type="datetimeFigureOut">
               <a:rPr lang="ru-RU" smtClean="0"/>
-              <a:t>23.01.2023</a:t>
+              <a:t>02.02.2023</a:t>
             </a:fld>
             <a:endParaRPr lang="ru-RU"/>
           </a:p>
@@ -3508,7 +3515,7 @@
           <a:p>
             <a:fld id="{73A3F40E-9102-4FC0-9332-A502299818A0}" type="datetimeFigureOut">
               <a:rPr lang="ru-RU" smtClean="0"/>
-              <a:t>23.01.2023</a:t>
+              <a:t>02.02.2023</a:t>
             </a:fld>
             <a:endParaRPr lang="ru-RU"/>
           </a:p>
@@ -3688,7 +3695,7 @@
           <a:p>
             <a:fld id="{73A3F40E-9102-4FC0-9332-A502299818A0}" type="datetimeFigureOut">
               <a:rPr lang="ru-RU" smtClean="0"/>
-              <a:t>23.01.2023</a:t>
+              <a:t>02.02.2023</a:t>
             </a:fld>
             <a:endParaRPr lang="ru-RU"/>
           </a:p>
@@ -3864,7 +3871,7 @@
           <a:p>
             <a:fld id="{73A3F40E-9102-4FC0-9332-A502299818A0}" type="datetimeFigureOut">
               <a:rPr lang="ru-RU" smtClean="0"/>
-              <a:t>23.01.2023</a:t>
+              <a:t>02.02.2023</a:t>
             </a:fld>
             <a:endParaRPr lang="ru-RU"/>
           </a:p>
@@ -4111,7 +4118,7 @@
           <a:p>
             <a:fld id="{73A3F40E-9102-4FC0-9332-A502299818A0}" type="datetimeFigureOut">
               <a:rPr lang="ru-RU" smtClean="0"/>
-              <a:t>23.01.2023</a:t>
+              <a:t>02.02.2023</a:t>
             </a:fld>
             <a:endParaRPr lang="ru-RU"/>
           </a:p>
@@ -4343,7 +4350,7 @@
           <a:p>
             <a:fld id="{73A3F40E-9102-4FC0-9332-A502299818A0}" type="datetimeFigureOut">
               <a:rPr lang="ru-RU" smtClean="0"/>
-              <a:t>23.01.2023</a:t>
+              <a:t>02.02.2023</a:t>
             </a:fld>
             <a:endParaRPr lang="ru-RU"/>
           </a:p>
@@ -4717,7 +4724,7 @@
           <a:p>
             <a:fld id="{73A3F40E-9102-4FC0-9332-A502299818A0}" type="datetimeFigureOut">
               <a:rPr lang="ru-RU" smtClean="0"/>
-              <a:t>23.01.2023</a:t>
+              <a:t>02.02.2023</a:t>
             </a:fld>
             <a:endParaRPr lang="ru-RU"/>
           </a:p>
@@ -4840,7 +4847,7 @@
           <a:p>
             <a:fld id="{73A3F40E-9102-4FC0-9332-A502299818A0}" type="datetimeFigureOut">
               <a:rPr lang="ru-RU" smtClean="0"/>
-              <a:t>23.01.2023</a:t>
+              <a:t>02.02.2023</a:t>
             </a:fld>
             <a:endParaRPr lang="ru-RU"/>
           </a:p>
@@ -4935,7 +4942,7 @@
           <a:p>
             <a:fld id="{73A3F40E-9102-4FC0-9332-A502299818A0}" type="datetimeFigureOut">
               <a:rPr lang="ru-RU" smtClean="0"/>
-              <a:t>23.01.2023</a:t>
+              <a:t>02.02.2023</a:t>
             </a:fld>
             <a:endParaRPr lang="ru-RU"/>
           </a:p>
@@ -5190,7 +5197,7 @@
           <a:p>
             <a:fld id="{73A3F40E-9102-4FC0-9332-A502299818A0}" type="datetimeFigureOut">
               <a:rPr lang="ru-RU" smtClean="0"/>
-              <a:t>23.01.2023</a:t>
+              <a:t>02.02.2023</a:t>
             </a:fld>
             <a:endParaRPr lang="ru-RU"/>
           </a:p>
@@ -5453,7 +5460,7 @@
           <a:p>
             <a:fld id="{73A3F40E-9102-4FC0-9332-A502299818A0}" type="datetimeFigureOut">
               <a:rPr lang="ru-RU" smtClean="0"/>
-              <a:t>23.01.2023</a:t>
+              <a:t>02.02.2023</a:t>
             </a:fld>
             <a:endParaRPr lang="ru-RU"/>
           </a:p>
@@ -6196,7 +6203,7 @@
           <a:p>
             <a:fld id="{73A3F40E-9102-4FC0-9332-A502299818A0}" type="datetimeFigureOut">
               <a:rPr lang="ru-RU" smtClean="0"/>
-              <a:t>23.01.2023</a:t>
+              <a:t>02.02.2023</a:t>
             </a:fld>
             <a:endParaRPr lang="ru-RU"/>
           </a:p>
@@ -6795,6 +6802,390 @@
 </p:sld>
 </file>
 
+<file path=ppt/slides/slide10.xml><?xml version="1.0" encoding="utf-8"?>
+<p:sld xmlns:a="http://schemas.openxmlformats.org/drawingml/2006/main" xmlns:r="http://schemas.openxmlformats.org/officeDocument/2006/relationships" xmlns:p="http://schemas.openxmlformats.org/presentationml/2006/main">
+  <p:cSld>
+    <p:spTree>
+      <p:nvGrpSpPr>
+        <p:cNvPr id="1" name=""/>
+        <p:cNvGrpSpPr/>
+        <p:nvPr/>
+      </p:nvGrpSpPr>
+      <p:grpSpPr>
+        <a:xfrm>
+          <a:off x="0" y="0"/>
+          <a:ext cx="0" cy="0"/>
+          <a:chOff x="0" y="0"/>
+          <a:chExt cx="0" cy="0"/>
+        </a:xfrm>
+      </p:grpSpPr>
+      <p:sp>
+        <p:nvSpPr>
+          <p:cNvPr id="2" name="Заголовок 1">
+            <a:extLst>
+              <a:ext uri="{FF2B5EF4-FFF2-40B4-BE49-F238E27FC236}">
+                <a16:creationId xmlns:a16="http://schemas.microsoft.com/office/drawing/2014/main" id="{5286B053-D69A-446B-BD25-06F220680DAB}"/>
+              </a:ext>
+            </a:extLst>
+          </p:cNvPr>
+          <p:cNvSpPr>
+            <a:spLocks noGrp="1"/>
+          </p:cNvSpPr>
+          <p:nvPr>
+            <p:ph type="title"/>
+          </p:nvPr>
+        </p:nvSpPr>
+        <p:spPr/>
+        <p:txBody>
+          <a:bodyPr/>
+          <a:lstStyle/>
+          <a:p>
+            <a:r>
+              <a:rPr lang="ru-RU" dirty="0"/>
+              <a:t>Вкладка </a:t>
+            </a:r>
+            <a:r>
+              <a:rPr lang="en-US" dirty="0"/>
+              <a:t>“</a:t>
+            </a:r>
+            <a:r>
+              <a:rPr lang="ru-RU" dirty="0"/>
+              <a:t>Аккаунт</a:t>
+            </a:r>
+            <a:r>
+              <a:rPr lang="en-US" dirty="0"/>
+              <a:t>”</a:t>
+            </a:r>
+            <a:r>
+              <a:rPr lang="ru-RU" dirty="0"/>
+              <a:t> без регистрации</a:t>
+            </a:r>
+          </a:p>
+        </p:txBody>
+      </p:sp>
+      <p:pic>
+        <p:nvPicPr>
+          <p:cNvPr id="4" name="Рисунок 3">
+            <a:extLst>
+              <a:ext uri="{FF2B5EF4-FFF2-40B4-BE49-F238E27FC236}">
+                <a16:creationId xmlns:a16="http://schemas.microsoft.com/office/drawing/2014/main" id="{FD7231B7-FD88-47D8-8317-00CCF86E059E}"/>
+              </a:ext>
+            </a:extLst>
+          </p:cNvPr>
+          <p:cNvPicPr>
+            <a:picLocks noChangeAspect="1"/>
+          </p:cNvPicPr>
+          <p:nvPr/>
+        </p:nvPicPr>
+        <p:blipFill>
+          <a:blip r:embed="rId2"/>
+          <a:stretch>
+            <a:fillRect/>
+          </a:stretch>
+        </p:blipFill>
+        <p:spPr>
+          <a:xfrm>
+            <a:off x="2157078" y="1467750"/>
+            <a:ext cx="7877843" cy="4966808"/>
+          </a:xfrm>
+          <a:prstGeom prst="rect">
+            <a:avLst/>
+          </a:prstGeom>
+        </p:spPr>
+      </p:pic>
+    </p:spTree>
+    <p:extLst>
+      <p:ext uri="{BB962C8B-B14F-4D97-AF65-F5344CB8AC3E}">
+        <p14:creationId xmlns:p14="http://schemas.microsoft.com/office/powerpoint/2010/main" val="1668479185"/>
+      </p:ext>
+    </p:extLst>
+  </p:cSld>
+  <p:clrMapOvr>
+    <a:masterClrMapping/>
+  </p:clrMapOvr>
+</p:sld>
+</file>
+
+<file path=ppt/slides/slide11.xml><?xml version="1.0" encoding="utf-8"?>
+<p:sld xmlns:a="http://schemas.openxmlformats.org/drawingml/2006/main" xmlns:r="http://schemas.openxmlformats.org/officeDocument/2006/relationships" xmlns:p="http://schemas.openxmlformats.org/presentationml/2006/main">
+  <p:cSld>
+    <p:spTree>
+      <p:nvGrpSpPr>
+        <p:cNvPr id="1" name=""/>
+        <p:cNvGrpSpPr/>
+        <p:nvPr/>
+      </p:nvGrpSpPr>
+      <p:grpSpPr>
+        <a:xfrm>
+          <a:off x="0" y="0"/>
+          <a:ext cx="0" cy="0"/>
+          <a:chOff x="0" y="0"/>
+          <a:chExt cx="0" cy="0"/>
+        </a:xfrm>
+      </p:grpSpPr>
+      <p:sp>
+        <p:nvSpPr>
+          <p:cNvPr id="2" name="Заголовок 1">
+            <a:extLst>
+              <a:ext uri="{FF2B5EF4-FFF2-40B4-BE49-F238E27FC236}">
+                <a16:creationId xmlns:a16="http://schemas.microsoft.com/office/drawing/2014/main" id="{39687458-928F-46FE-A455-FE3EE2AA5D49}"/>
+              </a:ext>
+            </a:extLst>
+          </p:cNvPr>
+          <p:cNvSpPr>
+            <a:spLocks noGrp="1"/>
+          </p:cNvSpPr>
+          <p:nvPr>
+            <p:ph type="title"/>
+          </p:nvPr>
+        </p:nvSpPr>
+        <p:spPr/>
+        <p:txBody>
+          <a:bodyPr/>
+          <a:lstStyle/>
+          <a:p>
+            <a:r>
+              <a:rPr lang="ru-RU" dirty="0"/>
+              <a:t>Вкладка </a:t>
+            </a:r>
+            <a:r>
+              <a:rPr lang="en-US" dirty="0"/>
+              <a:t>“</a:t>
+            </a:r>
+            <a:r>
+              <a:rPr lang="ru-RU" dirty="0"/>
+              <a:t>Аккаунт</a:t>
+            </a:r>
+            <a:r>
+              <a:rPr lang="en-US" dirty="0"/>
+              <a:t>”</a:t>
+            </a:r>
+            <a:r>
+              <a:rPr lang="ru-RU" dirty="0"/>
+              <a:t> с регистрации</a:t>
+            </a:r>
+          </a:p>
+        </p:txBody>
+      </p:sp>
+      <p:pic>
+        <p:nvPicPr>
+          <p:cNvPr id="4" name="Рисунок 3">
+            <a:extLst>
+              <a:ext uri="{FF2B5EF4-FFF2-40B4-BE49-F238E27FC236}">
+                <a16:creationId xmlns:a16="http://schemas.microsoft.com/office/drawing/2014/main" id="{467C716A-AC72-4505-985E-2EB4BEFB5B48}"/>
+              </a:ext>
+            </a:extLst>
+          </p:cNvPr>
+          <p:cNvPicPr>
+            <a:picLocks noChangeAspect="1"/>
+          </p:cNvPicPr>
+          <p:nvPr/>
+        </p:nvPicPr>
+        <p:blipFill>
+          <a:blip r:embed="rId2"/>
+          <a:stretch>
+            <a:fillRect/>
+          </a:stretch>
+        </p:blipFill>
+        <p:spPr>
+          <a:xfrm>
+            <a:off x="2268997" y="1412287"/>
+            <a:ext cx="7654006" cy="4836113"/>
+          </a:xfrm>
+          <a:prstGeom prst="rect">
+            <a:avLst/>
+          </a:prstGeom>
+        </p:spPr>
+      </p:pic>
+    </p:spTree>
+    <p:extLst>
+      <p:ext uri="{BB962C8B-B14F-4D97-AF65-F5344CB8AC3E}">
+        <p14:creationId xmlns:p14="http://schemas.microsoft.com/office/powerpoint/2010/main" val="3388114811"/>
+      </p:ext>
+    </p:extLst>
+  </p:cSld>
+  <p:clrMapOvr>
+    <a:masterClrMapping/>
+  </p:clrMapOvr>
+</p:sld>
+</file>
+
+<file path=ppt/slides/slide12.xml><?xml version="1.0" encoding="utf-8"?>
+<p:sld xmlns:a="http://schemas.openxmlformats.org/drawingml/2006/main" xmlns:r="http://schemas.openxmlformats.org/officeDocument/2006/relationships" xmlns:p="http://schemas.openxmlformats.org/presentationml/2006/main">
+  <p:cSld>
+    <p:spTree>
+      <p:nvGrpSpPr>
+        <p:cNvPr id="1" name=""/>
+        <p:cNvGrpSpPr/>
+        <p:nvPr/>
+      </p:nvGrpSpPr>
+      <p:grpSpPr>
+        <a:xfrm>
+          <a:off x="0" y="0"/>
+          <a:ext cx="0" cy="0"/>
+          <a:chOff x="0" y="0"/>
+          <a:chExt cx="0" cy="0"/>
+        </a:xfrm>
+      </p:grpSpPr>
+      <p:sp>
+        <p:nvSpPr>
+          <p:cNvPr id="2" name="Заголовок 1">
+            <a:extLst>
+              <a:ext uri="{FF2B5EF4-FFF2-40B4-BE49-F238E27FC236}">
+                <a16:creationId xmlns:a16="http://schemas.microsoft.com/office/drawing/2014/main" id="{FEC6830B-7B3E-456F-829C-62EC75408878}"/>
+              </a:ext>
+            </a:extLst>
+          </p:cNvPr>
+          <p:cNvSpPr>
+            <a:spLocks noGrp="1"/>
+          </p:cNvSpPr>
+          <p:nvPr>
+            <p:ph type="title"/>
+          </p:nvPr>
+        </p:nvSpPr>
+        <p:spPr/>
+        <p:txBody>
+          <a:bodyPr/>
+          <a:lstStyle/>
+          <a:p>
+            <a:r>
+              <a:rPr lang="ru-RU" dirty="0"/>
+              <a:t>Решение теста</a:t>
+            </a:r>
+          </a:p>
+        </p:txBody>
+      </p:sp>
+      <p:pic>
+        <p:nvPicPr>
+          <p:cNvPr id="6" name="Рисунок 5">
+            <a:extLst>
+              <a:ext uri="{FF2B5EF4-FFF2-40B4-BE49-F238E27FC236}">
+                <a16:creationId xmlns:a16="http://schemas.microsoft.com/office/drawing/2014/main" id="{D34E2120-2899-4CD5-AFB5-7984F270B3EB}"/>
+              </a:ext>
+            </a:extLst>
+          </p:cNvPr>
+          <p:cNvPicPr>
+            <a:picLocks noChangeAspect="1"/>
+          </p:cNvPicPr>
+          <p:nvPr/>
+        </p:nvPicPr>
+        <p:blipFill>
+          <a:blip r:embed="rId2"/>
+          <a:stretch>
+            <a:fillRect/>
+          </a:stretch>
+        </p:blipFill>
+        <p:spPr>
+          <a:xfrm>
+            <a:off x="2183275" y="1485192"/>
+            <a:ext cx="7825450" cy="4968416"/>
+          </a:xfrm>
+          <a:prstGeom prst="rect">
+            <a:avLst/>
+          </a:prstGeom>
+        </p:spPr>
+      </p:pic>
+    </p:spTree>
+    <p:extLst>
+      <p:ext uri="{BB962C8B-B14F-4D97-AF65-F5344CB8AC3E}">
+        <p14:creationId xmlns:p14="http://schemas.microsoft.com/office/powerpoint/2010/main" val="3929640376"/>
+      </p:ext>
+    </p:extLst>
+  </p:cSld>
+  <p:clrMapOvr>
+    <a:masterClrMapping/>
+  </p:clrMapOvr>
+</p:sld>
+</file>
+
+<file path=ppt/slides/slide13.xml><?xml version="1.0" encoding="utf-8"?>
+<p:sld xmlns:a="http://schemas.openxmlformats.org/drawingml/2006/main" xmlns:r="http://schemas.openxmlformats.org/officeDocument/2006/relationships" xmlns:p="http://schemas.openxmlformats.org/presentationml/2006/main">
+  <p:cSld>
+    <p:spTree>
+      <p:nvGrpSpPr>
+        <p:cNvPr id="1" name=""/>
+        <p:cNvGrpSpPr/>
+        <p:nvPr/>
+      </p:nvGrpSpPr>
+      <p:grpSpPr>
+        <a:xfrm>
+          <a:off x="0" y="0"/>
+          <a:ext cx="0" cy="0"/>
+          <a:chOff x="0" y="0"/>
+          <a:chExt cx="0" cy="0"/>
+        </a:xfrm>
+      </p:grpSpPr>
+      <p:sp>
+        <p:nvSpPr>
+          <p:cNvPr id="2" name="Заголовок 1">
+            <a:extLst>
+              <a:ext uri="{FF2B5EF4-FFF2-40B4-BE49-F238E27FC236}">
+                <a16:creationId xmlns:a16="http://schemas.microsoft.com/office/drawing/2014/main" id="{FA5FA57A-8823-4872-8126-DF8E43C2CBC6}"/>
+              </a:ext>
+            </a:extLst>
+          </p:cNvPr>
+          <p:cNvSpPr>
+            <a:spLocks noGrp="1"/>
+          </p:cNvSpPr>
+          <p:nvPr>
+            <p:ph type="title"/>
+          </p:nvPr>
+        </p:nvSpPr>
+        <p:spPr/>
+        <p:txBody>
+          <a:bodyPr/>
+          <a:lstStyle/>
+          <a:p>
+            <a:r>
+              <a:rPr lang="ru-RU" dirty="0"/>
+              <a:t>Уведомление о прохождении теста</a:t>
+            </a:r>
+          </a:p>
+        </p:txBody>
+      </p:sp>
+      <p:pic>
+        <p:nvPicPr>
+          <p:cNvPr id="4" name="Рисунок 3">
+            <a:extLst>
+              <a:ext uri="{FF2B5EF4-FFF2-40B4-BE49-F238E27FC236}">
+                <a16:creationId xmlns:a16="http://schemas.microsoft.com/office/drawing/2014/main" id="{660F2936-479C-4F28-BB85-56C73A05D277}"/>
+              </a:ext>
+            </a:extLst>
+          </p:cNvPr>
+          <p:cNvPicPr>
+            <a:picLocks noChangeAspect="1"/>
+          </p:cNvPicPr>
+          <p:nvPr/>
+        </p:nvPicPr>
+        <p:blipFill>
+          <a:blip r:embed="rId2"/>
+          <a:stretch>
+            <a:fillRect/>
+          </a:stretch>
+        </p:blipFill>
+        <p:spPr>
+          <a:xfrm>
+            <a:off x="3306112" y="2669344"/>
+            <a:ext cx="5579776" cy="1519312"/>
+          </a:xfrm>
+          <a:prstGeom prst="rect">
+            <a:avLst/>
+          </a:prstGeom>
+        </p:spPr>
+      </p:pic>
+    </p:spTree>
+    <p:extLst>
+      <p:ext uri="{BB962C8B-B14F-4D97-AF65-F5344CB8AC3E}">
+        <p14:creationId xmlns:p14="http://schemas.microsoft.com/office/powerpoint/2010/main" val="2642583314"/>
+      </p:ext>
+    </p:extLst>
+  </p:cSld>
+  <p:clrMapOvr>
+    <a:masterClrMapping/>
+  </p:clrMapOvr>
+</p:sld>
+</file>
+
 <file path=ppt/slides/slide2.xml><?xml version="1.0" encoding="utf-8"?>
 <p:sld xmlns:a="http://schemas.openxmlformats.org/drawingml/2006/main" xmlns:r="http://schemas.openxmlformats.org/officeDocument/2006/relationships" xmlns:p="http://schemas.openxmlformats.org/presentationml/2006/main">
   <p:cSld>
@@ -7677,6 +8068,270 @@
     <p:extLst>
       <p:ext uri="{BB962C8B-B14F-4D97-AF65-F5344CB8AC3E}">
         <p14:creationId xmlns:p14="http://schemas.microsoft.com/office/powerpoint/2010/main" val="3923296296"/>
+      </p:ext>
+    </p:extLst>
+  </p:cSld>
+  <p:clrMapOvr>
+    <a:masterClrMapping/>
+  </p:clrMapOvr>
+</p:sld>
+</file>
+
+<file path=ppt/slides/slide7.xml><?xml version="1.0" encoding="utf-8"?>
+<p:sld xmlns:a="http://schemas.openxmlformats.org/drawingml/2006/main" xmlns:r="http://schemas.openxmlformats.org/officeDocument/2006/relationships" xmlns:p="http://schemas.openxmlformats.org/presentationml/2006/main">
+  <p:cSld>
+    <p:spTree>
+      <p:nvGrpSpPr>
+        <p:cNvPr id="1" name=""/>
+        <p:cNvGrpSpPr/>
+        <p:nvPr/>
+      </p:nvGrpSpPr>
+      <p:grpSpPr>
+        <a:xfrm>
+          <a:off x="0" y="0"/>
+          <a:ext cx="0" cy="0"/>
+          <a:chOff x="0" y="0"/>
+          <a:chExt cx="0" cy="0"/>
+        </a:xfrm>
+      </p:grpSpPr>
+      <p:sp>
+        <p:nvSpPr>
+          <p:cNvPr id="2" name="Заголовок 1">
+            <a:extLst>
+              <a:ext uri="{FF2B5EF4-FFF2-40B4-BE49-F238E27FC236}">
+                <a16:creationId xmlns:a16="http://schemas.microsoft.com/office/drawing/2014/main" id="{53EEF215-9641-4586-8E7E-C7E2D7C806A6}"/>
+              </a:ext>
+            </a:extLst>
+          </p:cNvPr>
+          <p:cNvSpPr>
+            <a:spLocks noGrp="1"/>
+          </p:cNvSpPr>
+          <p:nvPr>
+            <p:ph type="title"/>
+          </p:nvPr>
+        </p:nvSpPr>
+        <p:spPr/>
+        <p:txBody>
+          <a:bodyPr/>
+          <a:lstStyle/>
+          <a:p>
+            <a:r>
+              <a:rPr lang="ru-RU" dirty="0"/>
+              <a:t>Главный экран</a:t>
+            </a:r>
+          </a:p>
+        </p:txBody>
+      </p:sp>
+      <p:pic>
+        <p:nvPicPr>
+          <p:cNvPr id="4" name="Рисунок 3">
+            <a:extLst>
+              <a:ext uri="{FF2B5EF4-FFF2-40B4-BE49-F238E27FC236}">
+                <a16:creationId xmlns:a16="http://schemas.microsoft.com/office/drawing/2014/main" id="{282C63BE-89BE-4B31-AE71-21DD52964894}"/>
+              </a:ext>
+            </a:extLst>
+          </p:cNvPr>
+          <p:cNvPicPr>
+            <a:picLocks noChangeAspect="1"/>
+          </p:cNvPicPr>
+          <p:nvPr/>
+        </p:nvPicPr>
+        <p:blipFill>
+          <a:blip r:embed="rId2"/>
+          <a:stretch>
+            <a:fillRect/>
+          </a:stretch>
+        </p:blipFill>
+        <p:spPr>
+          <a:xfrm>
+            <a:off x="2061828" y="1426823"/>
+            <a:ext cx="8068343" cy="5102986"/>
+          </a:xfrm>
+          <a:prstGeom prst="rect">
+            <a:avLst/>
+          </a:prstGeom>
+        </p:spPr>
+      </p:pic>
+    </p:spTree>
+    <p:extLst>
+      <p:ext uri="{BB962C8B-B14F-4D97-AF65-F5344CB8AC3E}">
+        <p14:creationId xmlns:p14="http://schemas.microsoft.com/office/powerpoint/2010/main" val="3428050957"/>
+      </p:ext>
+    </p:extLst>
+  </p:cSld>
+  <p:clrMapOvr>
+    <a:masterClrMapping/>
+  </p:clrMapOvr>
+</p:sld>
+</file>
+
+<file path=ppt/slides/slide8.xml><?xml version="1.0" encoding="utf-8"?>
+<p:sld xmlns:a="http://schemas.openxmlformats.org/drawingml/2006/main" xmlns:r="http://schemas.openxmlformats.org/officeDocument/2006/relationships" xmlns:p="http://schemas.openxmlformats.org/presentationml/2006/main">
+  <p:cSld>
+    <p:spTree>
+      <p:nvGrpSpPr>
+        <p:cNvPr id="1" name=""/>
+        <p:cNvGrpSpPr/>
+        <p:nvPr/>
+      </p:nvGrpSpPr>
+      <p:grpSpPr>
+        <a:xfrm>
+          <a:off x="0" y="0"/>
+          <a:ext cx="0" cy="0"/>
+          <a:chOff x="0" y="0"/>
+          <a:chExt cx="0" cy="0"/>
+        </a:xfrm>
+      </p:grpSpPr>
+      <p:sp>
+        <p:nvSpPr>
+          <p:cNvPr id="2" name="Заголовок 1">
+            <a:extLst>
+              <a:ext uri="{FF2B5EF4-FFF2-40B4-BE49-F238E27FC236}">
+                <a16:creationId xmlns:a16="http://schemas.microsoft.com/office/drawing/2014/main" id="{945E2A99-280E-44C5-B51D-E2A152E43793}"/>
+              </a:ext>
+            </a:extLst>
+          </p:cNvPr>
+          <p:cNvSpPr>
+            <a:spLocks noGrp="1"/>
+          </p:cNvSpPr>
+          <p:nvPr>
+            <p:ph type="title"/>
+          </p:nvPr>
+        </p:nvSpPr>
+        <p:spPr/>
+        <p:txBody>
+          <a:bodyPr/>
+          <a:lstStyle/>
+          <a:p>
+            <a:r>
+              <a:rPr lang="ru-RU" dirty="0"/>
+              <a:t>Теория, как выглядит</a:t>
+            </a:r>
+          </a:p>
+        </p:txBody>
+      </p:sp>
+      <p:pic>
+        <p:nvPicPr>
+          <p:cNvPr id="4" name="Рисунок 3">
+            <a:extLst>
+              <a:ext uri="{FF2B5EF4-FFF2-40B4-BE49-F238E27FC236}">
+                <a16:creationId xmlns:a16="http://schemas.microsoft.com/office/drawing/2014/main" id="{69DA5134-E2DB-44C4-9A12-C712DC29F849}"/>
+              </a:ext>
+            </a:extLst>
+          </p:cNvPr>
+          <p:cNvPicPr>
+            <a:picLocks noChangeAspect="1"/>
+          </p:cNvPicPr>
+          <p:nvPr/>
+        </p:nvPicPr>
+        <p:blipFill>
+          <a:blip r:embed="rId2"/>
+          <a:stretch>
+            <a:fillRect/>
+          </a:stretch>
+        </p:blipFill>
+        <p:spPr>
+          <a:xfrm>
+            <a:off x="1992773" y="1313298"/>
+            <a:ext cx="8206453" cy="5140306"/>
+          </a:xfrm>
+          <a:prstGeom prst="rect">
+            <a:avLst/>
+          </a:prstGeom>
+        </p:spPr>
+      </p:pic>
+    </p:spTree>
+    <p:extLst>
+      <p:ext uri="{BB962C8B-B14F-4D97-AF65-F5344CB8AC3E}">
+        <p14:creationId xmlns:p14="http://schemas.microsoft.com/office/powerpoint/2010/main" val="3494859849"/>
+      </p:ext>
+    </p:extLst>
+  </p:cSld>
+  <p:clrMapOvr>
+    <a:masterClrMapping/>
+  </p:clrMapOvr>
+</p:sld>
+</file>
+
+<file path=ppt/slides/slide9.xml><?xml version="1.0" encoding="utf-8"?>
+<p:sld xmlns:a="http://schemas.openxmlformats.org/drawingml/2006/main" xmlns:r="http://schemas.openxmlformats.org/officeDocument/2006/relationships" xmlns:p="http://schemas.openxmlformats.org/presentationml/2006/main">
+  <p:cSld>
+    <p:spTree>
+      <p:nvGrpSpPr>
+        <p:cNvPr id="1" name=""/>
+        <p:cNvGrpSpPr/>
+        <p:nvPr/>
+      </p:nvGrpSpPr>
+      <p:grpSpPr>
+        <a:xfrm>
+          <a:off x="0" y="0"/>
+          <a:ext cx="0" cy="0"/>
+          <a:chOff x="0" y="0"/>
+          <a:chExt cx="0" cy="0"/>
+        </a:xfrm>
+      </p:grpSpPr>
+      <p:sp>
+        <p:nvSpPr>
+          <p:cNvPr id="2" name="Заголовок 1">
+            <a:extLst>
+              <a:ext uri="{FF2B5EF4-FFF2-40B4-BE49-F238E27FC236}">
+                <a16:creationId xmlns:a16="http://schemas.microsoft.com/office/drawing/2014/main" id="{680CEE7F-5AE4-4CB1-B613-FBAAA4AE46C2}"/>
+              </a:ext>
+            </a:extLst>
+          </p:cNvPr>
+          <p:cNvSpPr>
+            <a:spLocks noGrp="1"/>
+          </p:cNvSpPr>
+          <p:nvPr>
+            <p:ph type="title"/>
+          </p:nvPr>
+        </p:nvSpPr>
+        <p:spPr/>
+        <p:txBody>
+          <a:bodyPr/>
+          <a:lstStyle/>
+          <a:p>
+            <a:r>
+              <a:rPr lang="ru-RU" dirty="0"/>
+              <a:t>Тесты без регистрации</a:t>
+            </a:r>
+          </a:p>
+        </p:txBody>
+      </p:sp>
+      <p:pic>
+        <p:nvPicPr>
+          <p:cNvPr id="4" name="Рисунок 3">
+            <a:extLst>
+              <a:ext uri="{FF2B5EF4-FFF2-40B4-BE49-F238E27FC236}">
+                <a16:creationId xmlns:a16="http://schemas.microsoft.com/office/drawing/2014/main" id="{A437D8F5-46BB-413B-9CF9-17B03EFA9CA6}"/>
+              </a:ext>
+            </a:extLst>
+          </p:cNvPr>
+          <p:cNvPicPr>
+            <a:picLocks noChangeAspect="1"/>
+          </p:cNvPicPr>
+          <p:nvPr/>
+        </p:nvPicPr>
+        <p:blipFill>
+          <a:blip r:embed="rId2"/>
+          <a:stretch>
+            <a:fillRect/>
+          </a:stretch>
+        </p:blipFill>
+        <p:spPr>
+          <a:xfrm>
+            <a:off x="2254527" y="2254995"/>
+            <a:ext cx="7682946" cy="2348010"/>
+          </a:xfrm>
+          <a:prstGeom prst="rect">
+            <a:avLst/>
+          </a:prstGeom>
+        </p:spPr>
+      </p:pic>
+    </p:spTree>
+    <p:extLst>
+      <p:ext uri="{BB962C8B-B14F-4D97-AF65-F5344CB8AC3E}">
+        <p14:creationId xmlns:p14="http://schemas.microsoft.com/office/powerpoint/2010/main" val="2630023370"/>
       </p:ext>
     </p:extLst>
   </p:cSld>

</xml_diff>